<commit_message>
Add another image and tie the text to the TCP BTL component example.
git-svn-id: http://www.aosabook.org/svn/volume2@684 dd5aa6cc-de63-413d-92ad-03a14aac4e6a
</commit_message>
<xml_diff>
--- a/tex/images/openmpi/open-mpi-images.pptx
+++ b/tex/images/openmpi/open-mpi-images.pptx
@@ -7,6 +7,7 @@
   <p:sldIdLst>
     <p:sldId id="256" r:id="rId2"/>
     <p:sldId id="257" r:id="rId3"/>
+    <p:sldId id="258" r:id="rId4"/>
   </p:sldIdLst>
   <p:sldSz cx="9144000" cy="6858000" type="screen4x3"/>
   <p:notesSz cx="6858000" cy="9144000"/>
@@ -3575,7 +3576,6 @@
               <a:rPr lang="en-US" sz="1000" dirty="0" smtClean="0"/>
               <a:t>)</a:t>
             </a:r>
-            <a:endParaRPr lang="en-US" sz="1000" dirty="0" smtClean="0"/>
           </a:p>
         </p:txBody>
       </p:sp>
@@ -3626,7 +3626,6 @@
               <a:rPr lang="en-US" sz="1000" dirty="0" smtClean="0"/>
               <a:t>)</a:t>
             </a:r>
-            <a:endParaRPr lang="en-US" sz="1000" dirty="0" smtClean="0"/>
           </a:p>
         </p:txBody>
       </p:sp>
@@ -3669,7 +3668,6 @@
               <a:rPr lang="en-US" sz="1000" dirty="0" smtClean="0"/>
               <a:t>High resolution timers (timer)</a:t>
             </a:r>
-            <a:endParaRPr lang="en-US" sz="1000" dirty="0" smtClean="0"/>
           </a:p>
         </p:txBody>
       </p:sp>
@@ -3809,7 +3807,6 @@
                 <a:rPr lang="en-US" sz="1000" dirty="0" smtClean="0"/>
                 <a:t>TCP</a:t>
               </a:r>
-              <a:endParaRPr lang="en-US" sz="1000" dirty="0" smtClean="0"/>
             </a:p>
           </p:txBody>
         </p:sp>
@@ -3853,7 +3850,6 @@
                 <a:rPr lang="en-US" sz="900" dirty="0" smtClean="0"/>
                 <a:t>Shared memory</a:t>
               </a:r>
-              <a:endParaRPr lang="en-US" sz="900" dirty="0" smtClean="0"/>
             </a:p>
           </p:txBody>
         </p:sp>
@@ -4033,7 +4029,6 @@
                 <a:rPr lang="en-US" sz="1000" dirty="0" smtClean="0"/>
                 <a:t>uned</a:t>
               </a:r>
-              <a:endParaRPr lang="en-US" sz="1000" dirty="0" smtClean="0"/>
             </a:p>
           </p:txBody>
         </p:sp>
@@ -4081,7 +4076,6 @@
                 <a:rPr lang="en-US" sz="900" dirty="0" smtClean="0"/>
                 <a:t>hared memory</a:t>
               </a:r>
-              <a:endParaRPr lang="en-US" sz="900" dirty="0" smtClean="0"/>
             </a:p>
           </p:txBody>
         </p:sp>
@@ -4125,7 +4119,6 @@
                 <a:rPr lang="en-US" sz="1000" dirty="0" smtClean="0"/>
                 <a:t>Loopback</a:t>
               </a:r>
-              <a:endParaRPr lang="en-US" sz="1000" dirty="0" smtClean="0"/>
             </a:p>
           </p:txBody>
         </p:sp>
@@ -4309,7 +4302,6 @@
                 <a:rPr lang="en-US" sz="1000" dirty="0" smtClean="0"/>
                 <a:t>SLURM</a:t>
               </a:r>
-              <a:endParaRPr lang="en-US" sz="1000" dirty="0" smtClean="0"/>
             </a:p>
           </p:txBody>
         </p:sp>
@@ -4353,7 +4345,6 @@
                 <a:rPr lang="en-US" sz="1000" dirty="0" smtClean="0"/>
                 <a:t>ALPS (Cray)</a:t>
               </a:r>
-              <a:endParaRPr lang="en-US" sz="1000" dirty="0" smtClean="0"/>
             </a:p>
           </p:txBody>
         </p:sp>
@@ -4489,7 +4480,6 @@
                 <a:rPr lang="en-US" sz="1000" dirty="0" smtClean="0"/>
                 <a:t>inux</a:t>
               </a:r>
-              <a:endParaRPr lang="en-US" sz="1000" dirty="0" smtClean="0"/>
             </a:p>
           </p:txBody>
         </p:sp>
@@ -4537,7 +4527,6 @@
                 <a:rPr lang="en-US" sz="1000" dirty="0" smtClean="0"/>
                 <a:t>arwin</a:t>
               </a:r>
-              <a:endParaRPr lang="en-US" sz="1000" dirty="0" smtClean="0"/>
             </a:p>
           </p:txBody>
         </p:sp>
@@ -4585,7 +4574,6 @@
                 <a:rPr lang="en-US" sz="1000" dirty="0" smtClean="0"/>
                 <a:t>indows</a:t>
               </a:r>
-              <a:endParaRPr lang="en-US" sz="1000" dirty="0" smtClean="0"/>
             </a:p>
           </p:txBody>
         </p:sp>
@@ -4767,6 +4755,739 @@
     <p:extLst>
       <p:ext uri="{BB962C8B-B14F-4D97-AF65-F5344CB8AC3E}">
         <p14:creationId xmlns:p14="http://schemas.microsoft.com/office/powerpoint/2010/main" val="529720688"/>
+      </p:ext>
+    </p:extLst>
+  </p:cSld>
+  <p:clrMapOvr>
+    <a:masterClrMapping/>
+  </p:clrMapOvr>
+</p:sld>
+</file>
+
+<file path=ppt/slides/slide3.xml><?xml version="1.0" encoding="utf-8"?>
+<p:sld xmlns:a="http://schemas.openxmlformats.org/drawingml/2006/main" xmlns:r="http://schemas.openxmlformats.org/officeDocument/2006/relationships" xmlns:p="http://schemas.openxmlformats.org/presentationml/2006/main">
+  <p:cSld>
+    <p:spTree>
+      <p:nvGrpSpPr>
+        <p:cNvPr id="1" name=""/>
+        <p:cNvGrpSpPr/>
+        <p:nvPr/>
+      </p:nvGrpSpPr>
+      <p:grpSpPr>
+        <a:xfrm>
+          <a:off x="0" y="0"/>
+          <a:ext cx="0" cy="0"/>
+          <a:chOff x="0" y="0"/>
+          <a:chExt cx="0" cy="0"/>
+        </a:xfrm>
+      </p:grpSpPr>
+      <p:sp>
+        <p:nvSpPr>
+          <p:cNvPr id="2" name="Rectangle 1"/>
+          <p:cNvSpPr/>
+          <p:nvPr/>
+        </p:nvSpPr>
+        <p:spPr>
+          <a:xfrm>
+            <a:off x="1458660" y="2764950"/>
+            <a:ext cx="3090085" cy="1694969"/>
+          </a:xfrm>
+          <a:prstGeom prst="rect">
+            <a:avLst/>
+          </a:prstGeom>
+          <a:noFill/>
+          <a:ln>
+            <a:solidFill>
+              <a:schemeClr val="tx1"/>
+            </a:solidFill>
+          </a:ln>
+        </p:spPr>
+        <p:style>
+          <a:lnRef idx="1">
+            <a:schemeClr val="accent1"/>
+          </a:lnRef>
+          <a:fillRef idx="3">
+            <a:schemeClr val="accent1"/>
+          </a:fillRef>
+          <a:effectRef idx="2">
+            <a:schemeClr val="accent1"/>
+          </a:effectRef>
+          <a:fontRef idx="minor">
+            <a:schemeClr val="lt1"/>
+          </a:fontRef>
+        </p:style>
+        <p:txBody>
+          <a:bodyPr rtlCol="0" anchor="ctr"/>
+          <a:lstStyle/>
+          <a:p>
+            <a:pPr algn="ctr"/>
+            <a:endParaRPr lang="en-US"/>
+          </a:p>
+        </p:txBody>
+      </p:sp>
+      <p:sp>
+        <p:nvSpPr>
+          <p:cNvPr id="3" name="TextBox 2"/>
+          <p:cNvSpPr txBox="1"/>
+          <p:nvPr/>
+        </p:nvSpPr>
+        <p:spPr>
+          <a:xfrm>
+            <a:off x="1458660" y="2764950"/>
+            <a:ext cx="3005800" cy="246221"/>
+          </a:xfrm>
+          <a:prstGeom prst="rect">
+            <a:avLst/>
+          </a:prstGeom>
+          <a:noFill/>
+        </p:spPr>
+        <p:txBody>
+          <a:bodyPr wrap="square" rtlCol="0">
+            <a:spAutoFit/>
+          </a:bodyPr>
+          <a:lstStyle/>
+          <a:p>
+            <a:r>
+              <a:rPr lang="en-US" sz="1000" dirty="0" err="1" smtClean="0"/>
+              <a:t>struct</a:t>
+            </a:r>
+            <a:r>
+              <a:rPr lang="en-US" sz="1000" dirty="0" smtClean="0"/>
+              <a:t> </a:t>
+            </a:r>
+            <a:r>
+              <a:rPr lang="en-US" sz="1000" dirty="0" err="1" smtClean="0"/>
+              <a:t>mca_btl_tcp_component_t</a:t>
+            </a:r>
+            <a:endParaRPr lang="en-US" sz="1000" dirty="0"/>
+          </a:p>
+        </p:txBody>
+      </p:sp>
+      <p:sp>
+        <p:nvSpPr>
+          <p:cNvPr id="5" name="TextBox 4"/>
+          <p:cNvSpPr txBox="1"/>
+          <p:nvPr/>
+        </p:nvSpPr>
+        <p:spPr>
+          <a:xfrm>
+            <a:off x="1676064" y="3058376"/>
+            <a:ext cx="2460786" cy="246221"/>
+          </a:xfrm>
+          <a:prstGeom prst="rect">
+            <a:avLst/>
+          </a:prstGeom>
+          <a:noFill/>
+        </p:spPr>
+        <p:txBody>
+          <a:bodyPr wrap="square" rtlCol="0">
+            <a:spAutoFit/>
+          </a:bodyPr>
+          <a:lstStyle/>
+          <a:p>
+            <a:r>
+              <a:rPr lang="en-US" sz="1000" dirty="0" err="1" smtClean="0"/>
+              <a:t>struct</a:t>
+            </a:r>
+            <a:r>
+              <a:rPr lang="en-US" sz="1000" dirty="0" smtClean="0"/>
+              <a:t> mca_btl_base_component_2_0_0_t </a:t>
+            </a:r>
+            <a:endParaRPr lang="en-US" sz="1000" dirty="0"/>
+          </a:p>
+        </p:txBody>
+      </p:sp>
+      <p:sp>
+        <p:nvSpPr>
+          <p:cNvPr id="6" name="TextBox 5"/>
+          <p:cNvSpPr txBox="1"/>
+          <p:nvPr/>
+        </p:nvSpPr>
+        <p:spPr>
+          <a:xfrm>
+            <a:off x="1878467" y="3362342"/>
+            <a:ext cx="2460786" cy="246221"/>
+          </a:xfrm>
+          <a:prstGeom prst="rect">
+            <a:avLst/>
+          </a:prstGeom>
+          <a:noFill/>
+        </p:spPr>
+        <p:txBody>
+          <a:bodyPr wrap="square" rtlCol="0">
+            <a:spAutoFit/>
+          </a:bodyPr>
+          <a:lstStyle/>
+          <a:p>
+            <a:r>
+              <a:rPr lang="en-US" sz="1000" dirty="0" err="1" smtClean="0"/>
+              <a:t>struct</a:t>
+            </a:r>
+            <a:r>
+              <a:rPr lang="en-US" sz="1000" dirty="0" smtClean="0"/>
+              <a:t> mca_base_component_2_0_0_t </a:t>
+            </a:r>
+            <a:endParaRPr lang="en-US" sz="1000" dirty="0"/>
+          </a:p>
+        </p:txBody>
+      </p:sp>
+      <p:sp>
+        <p:nvSpPr>
+          <p:cNvPr id="7" name="Rectangle 6"/>
+          <p:cNvSpPr/>
+          <p:nvPr/>
+        </p:nvSpPr>
+        <p:spPr>
+          <a:xfrm>
+            <a:off x="1676064" y="3052345"/>
+            <a:ext cx="2663189" cy="1122579"/>
+          </a:xfrm>
+          <a:prstGeom prst="rect">
+            <a:avLst/>
+          </a:prstGeom>
+          <a:noFill/>
+          <a:ln>
+            <a:solidFill>
+              <a:schemeClr val="tx1"/>
+            </a:solidFill>
+          </a:ln>
+        </p:spPr>
+        <p:style>
+          <a:lnRef idx="1">
+            <a:schemeClr val="accent1"/>
+          </a:lnRef>
+          <a:fillRef idx="3">
+            <a:schemeClr val="accent1"/>
+          </a:fillRef>
+          <a:effectRef idx="2">
+            <a:schemeClr val="accent1"/>
+          </a:effectRef>
+          <a:fontRef idx="minor">
+            <a:schemeClr val="lt1"/>
+          </a:fontRef>
+        </p:style>
+        <p:txBody>
+          <a:bodyPr rtlCol="0" anchor="ctr"/>
+          <a:lstStyle/>
+          <a:p>
+            <a:pPr algn="ctr"/>
+            <a:endParaRPr lang="en-US"/>
+          </a:p>
+        </p:txBody>
+      </p:sp>
+      <p:sp>
+        <p:nvSpPr>
+          <p:cNvPr id="8" name="Rectangle 7"/>
+          <p:cNvSpPr/>
+          <p:nvPr/>
+        </p:nvSpPr>
+        <p:spPr>
+          <a:xfrm>
+            <a:off x="1878467" y="3362343"/>
+            <a:ext cx="2258383" cy="502588"/>
+          </a:xfrm>
+          <a:prstGeom prst="rect">
+            <a:avLst/>
+          </a:prstGeom>
+          <a:noFill/>
+          <a:ln>
+            <a:solidFill>
+              <a:schemeClr val="tx1"/>
+            </a:solidFill>
+          </a:ln>
+        </p:spPr>
+        <p:style>
+          <a:lnRef idx="1">
+            <a:schemeClr val="accent1"/>
+          </a:lnRef>
+          <a:fillRef idx="3">
+            <a:schemeClr val="accent1"/>
+          </a:fillRef>
+          <a:effectRef idx="2">
+            <a:schemeClr val="accent1"/>
+          </a:effectRef>
+          <a:fontRef idx="minor">
+            <a:schemeClr val="lt1"/>
+          </a:fontRef>
+        </p:style>
+        <p:txBody>
+          <a:bodyPr rtlCol="0" anchor="ctr"/>
+          <a:lstStyle/>
+          <a:p>
+            <a:pPr algn="ctr"/>
+            <a:endParaRPr lang="en-US"/>
+          </a:p>
+        </p:txBody>
+      </p:sp>
+      <p:grpSp>
+        <p:nvGrpSpPr>
+          <p:cNvPr id="27" name="Group 26"/>
+          <p:cNvGrpSpPr/>
+          <p:nvPr/>
+        </p:nvGrpSpPr>
+        <p:grpSpPr>
+          <a:xfrm>
+            <a:off x="5231621" y="2761535"/>
+            <a:ext cx="1750048" cy="499269"/>
+            <a:chOff x="5233747" y="2764951"/>
+            <a:chExt cx="1750048" cy="803480"/>
+          </a:xfrm>
+        </p:grpSpPr>
+        <p:sp>
+          <p:nvSpPr>
+            <p:cNvPr id="12" name="Rounded Rectangle 11"/>
+            <p:cNvSpPr/>
+            <p:nvPr/>
+          </p:nvSpPr>
+          <p:spPr>
+            <a:xfrm>
+              <a:off x="5233747" y="2764951"/>
+              <a:ext cx="1750048" cy="803480"/>
+            </a:xfrm>
+            <a:prstGeom prst="roundRect">
+              <a:avLst/>
+            </a:prstGeom>
+            <a:gradFill>
+              <a:gsLst>
+                <a:gs pos="0">
+                  <a:schemeClr val="bg1"/>
+                </a:gs>
+                <a:gs pos="100000">
+                  <a:schemeClr val="dk1">
+                    <a:tint val="50000"/>
+                    <a:shade val="100000"/>
+                    <a:satMod val="350000"/>
+                  </a:schemeClr>
+                </a:gs>
+              </a:gsLst>
+            </a:gradFill>
+          </p:spPr>
+          <p:style>
+            <a:lnRef idx="1">
+              <a:schemeClr val="dk1"/>
+            </a:lnRef>
+            <a:fillRef idx="3">
+              <a:schemeClr val="dk1"/>
+            </a:fillRef>
+            <a:effectRef idx="2">
+              <a:schemeClr val="dk1"/>
+            </a:effectRef>
+            <a:fontRef idx="minor">
+              <a:schemeClr val="lt1"/>
+            </a:fontRef>
+          </p:style>
+          <p:txBody>
+            <a:bodyPr rtlCol="0" anchor="ctr"/>
+            <a:lstStyle/>
+            <a:p>
+              <a:pPr algn="ctr"/>
+              <a:endParaRPr lang="en-US" dirty="0"/>
+            </a:p>
+          </p:txBody>
+        </p:sp>
+        <p:sp>
+          <p:nvSpPr>
+            <p:cNvPr id="9" name="TextBox 8"/>
+            <p:cNvSpPr txBox="1"/>
+            <p:nvPr/>
+          </p:nvSpPr>
+          <p:spPr>
+            <a:xfrm>
+              <a:off x="5233747" y="2863716"/>
+              <a:ext cx="1750048" cy="400111"/>
+            </a:xfrm>
+            <a:prstGeom prst="rect">
+              <a:avLst/>
+            </a:prstGeom>
+            <a:noFill/>
+          </p:spPr>
+          <p:txBody>
+            <a:bodyPr wrap="square" rtlCol="0">
+              <a:spAutoFit/>
+            </a:bodyPr>
+            <a:lstStyle/>
+            <a:p>
+              <a:pPr algn="ctr"/>
+              <a:r>
+                <a:rPr lang="en-US" sz="1000" dirty="0" err="1" smtClean="0"/>
+                <a:t>struct</a:t>
+              </a:r>
+              <a:r>
+                <a:rPr lang="en-US" sz="1000" dirty="0" smtClean="0"/>
+                <a:t> </a:t>
+              </a:r>
+              <a:r>
+                <a:rPr lang="en-US" sz="1000" dirty="0" err="1" smtClean="0"/>
+                <a:t>mca_btl_tcp_module_t</a:t>
+              </a:r>
+              <a:endParaRPr lang="en-US" sz="1000" dirty="0" smtClean="0"/>
+            </a:p>
+            <a:p>
+              <a:pPr algn="ctr"/>
+              <a:r>
+                <a:rPr lang="en-US" sz="1000" dirty="0"/>
+                <a:t>B</a:t>
+              </a:r>
+              <a:r>
+                <a:rPr lang="en-US" sz="1000" dirty="0" smtClean="0"/>
+                <a:t>ound to eth0</a:t>
+              </a:r>
+              <a:endParaRPr lang="en-US" sz="1000" dirty="0"/>
+            </a:p>
+          </p:txBody>
+        </p:sp>
+      </p:grpSp>
+      <p:sp>
+        <p:nvSpPr>
+          <p:cNvPr id="11" name="TextBox 10"/>
+          <p:cNvSpPr txBox="1"/>
+          <p:nvPr/>
+        </p:nvSpPr>
+        <p:spPr>
+          <a:xfrm>
+            <a:off x="4500342" y="3195668"/>
+            <a:ext cx="800219" cy="861774"/>
+          </a:xfrm>
+          <a:prstGeom prst="rect">
+            <a:avLst/>
+          </a:prstGeom>
+          <a:noFill/>
+        </p:spPr>
+        <p:txBody>
+          <a:bodyPr wrap="none" rtlCol="0">
+            <a:spAutoFit/>
+          </a:bodyPr>
+          <a:lstStyle/>
+          <a:p>
+            <a:pPr algn="ctr"/>
+            <a:r>
+              <a:rPr lang="en-US" sz="1000" dirty="0" smtClean="0"/>
+              <a:t>Component</a:t>
+            </a:r>
+          </a:p>
+          <a:p>
+            <a:pPr algn="ctr"/>
+            <a:r>
+              <a:rPr lang="en-US" sz="1000" dirty="0" smtClean="0"/>
+              <a:t>creates</a:t>
+            </a:r>
+          </a:p>
+          <a:p>
+            <a:pPr algn="ctr"/>
+            <a:endParaRPr lang="en-US" sz="1000" dirty="0" smtClean="0"/>
+          </a:p>
+          <a:p>
+            <a:pPr algn="ctr"/>
+            <a:r>
+              <a:rPr lang="en-US" sz="1000" dirty="0" smtClean="0"/>
+              <a:t>module</a:t>
+            </a:r>
+          </a:p>
+          <a:p>
+            <a:pPr algn="ctr"/>
+            <a:r>
+              <a:rPr lang="en-US" sz="1000" dirty="0" err="1" smtClean="0"/>
+              <a:t>structs</a:t>
+            </a:r>
+            <a:endParaRPr lang="en-US" sz="1000" dirty="0" smtClean="0"/>
+          </a:p>
+        </p:txBody>
+      </p:sp>
+      <p:sp>
+        <p:nvSpPr>
+          <p:cNvPr id="4" name="Right Arrow 3"/>
+          <p:cNvSpPr/>
+          <p:nvPr/>
+        </p:nvSpPr>
+        <p:spPr>
+          <a:xfrm>
+            <a:off x="4683732" y="3550662"/>
+            <a:ext cx="475013" cy="178626"/>
+          </a:xfrm>
+          <a:prstGeom prst="rightArrow">
+            <a:avLst/>
+          </a:prstGeom>
+          <a:gradFill flip="none" rotWithShape="1">
+            <a:gsLst>
+              <a:gs pos="0">
+                <a:schemeClr val="tx1"/>
+              </a:gs>
+              <a:gs pos="100000">
+                <a:prstClr val="white"/>
+              </a:gs>
+            </a:gsLst>
+            <a:lin ang="14340000" scaled="0"/>
+            <a:tileRect/>
+          </a:gradFill>
+          <a:ln>
+            <a:solidFill>
+              <a:schemeClr val="tx1"/>
+            </a:solidFill>
+          </a:ln>
+        </p:spPr>
+        <p:style>
+          <a:lnRef idx="1">
+            <a:schemeClr val="accent1"/>
+          </a:lnRef>
+          <a:fillRef idx="3">
+            <a:schemeClr val="accent1"/>
+          </a:fillRef>
+          <a:effectRef idx="2">
+            <a:schemeClr val="accent1"/>
+          </a:effectRef>
+          <a:fontRef idx="minor">
+            <a:schemeClr val="lt1"/>
+          </a:fontRef>
+        </p:style>
+        <p:txBody>
+          <a:bodyPr rtlCol="0" anchor="ctr"/>
+          <a:lstStyle/>
+          <a:p>
+            <a:pPr algn="ctr"/>
+            <a:endParaRPr lang="en-US"/>
+          </a:p>
+        </p:txBody>
+      </p:sp>
+      <p:grpSp>
+        <p:nvGrpSpPr>
+          <p:cNvPr id="34" name="Group 33"/>
+          <p:cNvGrpSpPr/>
+          <p:nvPr/>
+        </p:nvGrpSpPr>
+        <p:grpSpPr>
+          <a:xfrm>
+            <a:off x="5231621" y="3361093"/>
+            <a:ext cx="1750048" cy="499269"/>
+            <a:chOff x="5233747" y="2764951"/>
+            <a:chExt cx="1750048" cy="803480"/>
+          </a:xfrm>
+        </p:grpSpPr>
+        <p:sp>
+          <p:nvSpPr>
+            <p:cNvPr id="35" name="Rounded Rectangle 34"/>
+            <p:cNvSpPr/>
+            <p:nvPr/>
+          </p:nvSpPr>
+          <p:spPr>
+            <a:xfrm>
+              <a:off x="5233747" y="2764951"/>
+              <a:ext cx="1750048" cy="803480"/>
+            </a:xfrm>
+            <a:prstGeom prst="roundRect">
+              <a:avLst/>
+            </a:prstGeom>
+            <a:gradFill>
+              <a:gsLst>
+                <a:gs pos="0">
+                  <a:schemeClr val="bg1"/>
+                </a:gs>
+                <a:gs pos="100000">
+                  <a:schemeClr val="dk1">
+                    <a:tint val="50000"/>
+                    <a:shade val="100000"/>
+                    <a:satMod val="350000"/>
+                  </a:schemeClr>
+                </a:gs>
+              </a:gsLst>
+            </a:gradFill>
+          </p:spPr>
+          <p:style>
+            <a:lnRef idx="1">
+              <a:schemeClr val="dk1"/>
+            </a:lnRef>
+            <a:fillRef idx="3">
+              <a:schemeClr val="dk1"/>
+            </a:fillRef>
+            <a:effectRef idx="2">
+              <a:schemeClr val="dk1"/>
+            </a:effectRef>
+            <a:fontRef idx="minor">
+              <a:schemeClr val="lt1"/>
+            </a:fontRef>
+          </p:style>
+          <p:txBody>
+            <a:bodyPr rtlCol="0" anchor="ctr"/>
+            <a:lstStyle/>
+            <a:p>
+              <a:pPr algn="ctr"/>
+              <a:endParaRPr lang="en-US" dirty="0"/>
+            </a:p>
+          </p:txBody>
+        </p:sp>
+        <p:sp>
+          <p:nvSpPr>
+            <p:cNvPr id="36" name="TextBox 35"/>
+            <p:cNvSpPr txBox="1"/>
+            <p:nvPr/>
+          </p:nvSpPr>
+          <p:spPr>
+            <a:xfrm>
+              <a:off x="5233747" y="2863716"/>
+              <a:ext cx="1750048" cy="643902"/>
+            </a:xfrm>
+            <a:prstGeom prst="rect">
+              <a:avLst/>
+            </a:prstGeom>
+            <a:noFill/>
+          </p:spPr>
+          <p:txBody>
+            <a:bodyPr wrap="square" rtlCol="0">
+              <a:spAutoFit/>
+            </a:bodyPr>
+            <a:lstStyle/>
+            <a:p>
+              <a:pPr algn="ctr"/>
+              <a:r>
+                <a:rPr lang="en-US" sz="1000" dirty="0" err="1" smtClean="0"/>
+                <a:t>struct</a:t>
+              </a:r>
+              <a:r>
+                <a:rPr lang="en-US" sz="1000" dirty="0" smtClean="0"/>
+                <a:t> </a:t>
+              </a:r>
+              <a:r>
+                <a:rPr lang="en-US" sz="1000" dirty="0" err="1" smtClean="0"/>
+                <a:t>mca_btl_tcp_module_t</a:t>
+              </a:r>
+              <a:endParaRPr lang="en-US" sz="1000" dirty="0" smtClean="0"/>
+            </a:p>
+            <a:p>
+              <a:pPr algn="ctr"/>
+              <a:r>
+                <a:rPr lang="en-US" sz="1000" dirty="0"/>
+                <a:t>B</a:t>
+              </a:r>
+              <a:r>
+                <a:rPr lang="en-US" sz="1000" dirty="0" smtClean="0"/>
+                <a:t>ound to eth1</a:t>
+              </a:r>
+              <a:endParaRPr lang="en-US" sz="1000" dirty="0"/>
+            </a:p>
+          </p:txBody>
+        </p:sp>
+      </p:grpSp>
+      <p:grpSp>
+        <p:nvGrpSpPr>
+          <p:cNvPr id="37" name="Group 36"/>
+          <p:cNvGrpSpPr/>
+          <p:nvPr/>
+        </p:nvGrpSpPr>
+        <p:grpSpPr>
+          <a:xfrm>
+            <a:off x="5231621" y="3960650"/>
+            <a:ext cx="1750048" cy="499269"/>
+            <a:chOff x="5233747" y="2764951"/>
+            <a:chExt cx="1750048" cy="803480"/>
+          </a:xfrm>
+        </p:grpSpPr>
+        <p:sp>
+          <p:nvSpPr>
+            <p:cNvPr id="38" name="Rounded Rectangle 37"/>
+            <p:cNvSpPr/>
+            <p:nvPr/>
+          </p:nvSpPr>
+          <p:spPr>
+            <a:xfrm>
+              <a:off x="5233747" y="2764951"/>
+              <a:ext cx="1750048" cy="803480"/>
+            </a:xfrm>
+            <a:prstGeom prst="roundRect">
+              <a:avLst/>
+            </a:prstGeom>
+            <a:gradFill>
+              <a:gsLst>
+                <a:gs pos="0">
+                  <a:schemeClr val="bg1"/>
+                </a:gs>
+                <a:gs pos="100000">
+                  <a:schemeClr val="dk1">
+                    <a:tint val="50000"/>
+                    <a:shade val="100000"/>
+                    <a:satMod val="350000"/>
+                  </a:schemeClr>
+                </a:gs>
+              </a:gsLst>
+            </a:gradFill>
+          </p:spPr>
+          <p:style>
+            <a:lnRef idx="1">
+              <a:schemeClr val="dk1"/>
+            </a:lnRef>
+            <a:fillRef idx="3">
+              <a:schemeClr val="dk1"/>
+            </a:fillRef>
+            <a:effectRef idx="2">
+              <a:schemeClr val="dk1"/>
+            </a:effectRef>
+            <a:fontRef idx="minor">
+              <a:schemeClr val="lt1"/>
+            </a:fontRef>
+          </p:style>
+          <p:txBody>
+            <a:bodyPr rtlCol="0" anchor="ctr"/>
+            <a:lstStyle/>
+            <a:p>
+              <a:pPr algn="ctr"/>
+              <a:endParaRPr lang="en-US" dirty="0"/>
+            </a:p>
+          </p:txBody>
+        </p:sp>
+        <p:sp>
+          <p:nvSpPr>
+            <p:cNvPr id="39" name="TextBox 38"/>
+            <p:cNvSpPr txBox="1"/>
+            <p:nvPr/>
+          </p:nvSpPr>
+          <p:spPr>
+            <a:xfrm>
+              <a:off x="5233747" y="2863716"/>
+              <a:ext cx="1750048" cy="643902"/>
+            </a:xfrm>
+            <a:prstGeom prst="rect">
+              <a:avLst/>
+            </a:prstGeom>
+            <a:noFill/>
+          </p:spPr>
+          <p:txBody>
+            <a:bodyPr wrap="square" rtlCol="0">
+              <a:spAutoFit/>
+            </a:bodyPr>
+            <a:lstStyle/>
+            <a:p>
+              <a:pPr algn="ctr"/>
+              <a:r>
+                <a:rPr lang="en-US" sz="1000" dirty="0" err="1" smtClean="0"/>
+                <a:t>struct</a:t>
+              </a:r>
+              <a:r>
+                <a:rPr lang="en-US" sz="1000" dirty="0" smtClean="0"/>
+                <a:t> </a:t>
+              </a:r>
+              <a:r>
+                <a:rPr lang="en-US" sz="1000" dirty="0" err="1" smtClean="0"/>
+                <a:t>mca_btl_tcp_module_t</a:t>
+              </a:r>
+              <a:endParaRPr lang="en-US" sz="1000" dirty="0" smtClean="0"/>
+            </a:p>
+            <a:p>
+              <a:pPr algn="ctr"/>
+              <a:r>
+                <a:rPr lang="en-US" sz="1000" dirty="0"/>
+                <a:t>B</a:t>
+              </a:r>
+              <a:r>
+                <a:rPr lang="en-US" sz="1000" dirty="0" smtClean="0"/>
+                <a:t>ound to eth2</a:t>
+              </a:r>
+              <a:endParaRPr lang="en-US" sz="1000" dirty="0"/>
+            </a:p>
+          </p:txBody>
+        </p:sp>
+      </p:grpSp>
+    </p:spTree>
+    <p:extLst>
+      <p:ext uri="{BB962C8B-B14F-4D97-AF65-F5344CB8AC3E}">
+        <p14:creationId xmlns:p14="http://schemas.microsoft.com/office/powerpoint/2010/main" val="51570739"/>
       </p:ext>
     </p:extLst>
   </p:cSld>

</xml_diff>